<commit_message>
updated final powerpoint to reflect design changes
Really just added the updated ER diagram and change one or two url
mappings
</commit_message>
<xml_diff>
--- a/docs/Design presentation/presentation.pptx
+++ b/docs/Design presentation/presentation.pptx
@@ -227,7 +227,7 @@
             <a:fld id="{3BB74382-EDD2-490F-9388-C1D0E6077212}" type="datetimeFigureOut">
               <a:rPr lang="en-GB" smtClean="0"/>
               <a:pPr/>
-              <a:t>22/02/2015</a:t>
+              <a:t>21/03/2015</a:t>
             </a:fld>
             <a:endParaRPr lang="en-GB"/>
           </a:p>
@@ -923,7 +923,7 @@
             <a:fld id="{3FEB6C20-88C7-4B3D-B23C-A0B2BF770696}" type="datetimeFigureOut">
               <a:rPr lang="en-GB" smtClean="0"/>
               <a:pPr/>
-              <a:t>22/02/2015</a:t>
+              <a:t>21/03/2015</a:t>
             </a:fld>
             <a:endParaRPr lang="en-GB"/>
           </a:p>
@@ -1284,7 +1284,7 @@
             <a:fld id="{3FEB6C20-88C7-4B3D-B23C-A0B2BF770696}" type="datetimeFigureOut">
               <a:rPr lang="en-GB" smtClean="0"/>
               <a:pPr/>
-              <a:t>22/02/2015</a:t>
+              <a:t>21/03/2015</a:t>
             </a:fld>
             <a:endParaRPr lang="en-GB"/>
           </a:p>
@@ -1461,7 +1461,7 @@
             <a:fld id="{3FEB6C20-88C7-4B3D-B23C-A0B2BF770696}" type="datetimeFigureOut">
               <a:rPr lang="en-GB" smtClean="0"/>
               <a:pPr/>
-              <a:t>22/02/2015</a:t>
+              <a:t>21/03/2015</a:t>
             </a:fld>
             <a:endParaRPr lang="en-GB"/>
           </a:p>
@@ -1698,7 +1698,7 @@
             <a:fld id="{3FEB6C20-88C7-4B3D-B23C-A0B2BF770696}" type="datetimeFigureOut">
               <a:rPr lang="en-GB" smtClean="0"/>
               <a:pPr/>
-              <a:t>22/02/2015</a:t>
+              <a:t>21/03/2015</a:t>
             </a:fld>
             <a:endParaRPr lang="en-GB"/>
           </a:p>
@@ -1969,7 +1969,7 @@
             <a:fld id="{3FEB6C20-88C7-4B3D-B23C-A0B2BF770696}" type="datetimeFigureOut">
               <a:rPr lang="en-GB" smtClean="0"/>
               <a:pPr/>
-              <a:t>22/02/2015</a:t>
+              <a:t>21/03/2015</a:t>
             </a:fld>
             <a:endParaRPr lang="en-GB"/>
           </a:p>
@@ -2191,7 +2191,7 @@
             <a:fld id="{3FEB6C20-88C7-4B3D-B23C-A0B2BF770696}" type="datetimeFigureOut">
               <a:rPr lang="en-GB" smtClean="0"/>
               <a:pPr/>
-              <a:t>22/02/2015</a:t>
+              <a:t>21/03/2015</a:t>
             </a:fld>
             <a:endParaRPr lang="en-GB"/>
           </a:p>
@@ -2545,7 +2545,7 @@
             <a:fld id="{3FEB6C20-88C7-4B3D-B23C-A0B2BF770696}" type="datetimeFigureOut">
               <a:rPr lang="en-GB" smtClean="0"/>
               <a:pPr/>
-              <a:t>22/02/2015</a:t>
+              <a:t>21/03/2015</a:t>
             </a:fld>
             <a:endParaRPr lang="en-GB"/>
           </a:p>
@@ -2779,7 +2779,7 @@
             <a:fld id="{3FEB6C20-88C7-4B3D-B23C-A0B2BF770696}" type="datetimeFigureOut">
               <a:rPr lang="en-GB" smtClean="0"/>
               <a:pPr/>
-              <a:t>22/02/2015</a:t>
+              <a:t>21/03/2015</a:t>
             </a:fld>
             <a:endParaRPr lang="en-GB"/>
           </a:p>
@@ -2921,7 +2921,7 @@
             <a:fld id="{3FEB6C20-88C7-4B3D-B23C-A0B2BF770696}" type="datetimeFigureOut">
               <a:rPr lang="en-GB" smtClean="0"/>
               <a:pPr/>
-              <a:t>22/02/2015</a:t>
+              <a:t>21/03/2015</a:t>
             </a:fld>
             <a:endParaRPr lang="en-GB"/>
           </a:p>
@@ -3200,7 +3200,7 @@
             <a:fld id="{3FEB6C20-88C7-4B3D-B23C-A0B2BF770696}" type="datetimeFigureOut">
               <a:rPr lang="en-GB" smtClean="0"/>
               <a:pPr/>
-              <a:t>22/02/2015</a:t>
+              <a:t>21/03/2015</a:t>
             </a:fld>
             <a:endParaRPr lang="en-GB"/>
           </a:p>
@@ -3609,7 +3609,7 @@
             <a:fld id="{3FEB6C20-88C7-4B3D-B23C-A0B2BF770696}" type="datetimeFigureOut">
               <a:rPr lang="en-GB" smtClean="0"/>
               <a:pPr/>
-              <a:t>22/02/2015</a:t>
+              <a:t>21/03/2015</a:t>
             </a:fld>
             <a:endParaRPr lang="en-GB"/>
           </a:p>
@@ -3949,7 +3949,7 @@
             <a:fld id="{3FEB6C20-88C7-4B3D-B23C-A0B2BF770696}" type="datetimeFigureOut">
               <a:rPr lang="en-GB" smtClean="0"/>
               <a:pPr/>
-              <a:t>22/02/2015</a:t>
+              <a:t>21/03/2015</a:t>
             </a:fld>
             <a:endParaRPr lang="en-GB"/>
           </a:p>
@@ -5678,9 +5678,6 @@
               </a:rPr>
               <a:t>types of 'special tags', like the university/college tags</a:t>
             </a:r>
-            <a:endParaRPr lang="en-GB" sz="1200" dirty="0">
-              <a:latin typeface="Lucida Sans" pitchFamily="34" charset="0"/>
-            </a:endParaRPr>
           </a:p>
         </p:txBody>
       </p:sp>
@@ -6741,7 +6738,7 @@
             <p:ph sz="quarter" idx="1"/>
             <p:extLst>
               <p:ext uri="{D42A27DB-BD31-4B8C-83A1-F6EECF244321}">
-                <p14:modId xmlns:p14="http://schemas.microsoft.com/office/powerpoint/2010/main" val="963210065"/>
+                <p14:modId xmlns:p14="http://schemas.microsoft.com/office/powerpoint/2010/main" val="3664494018"/>
               </p:ext>
             </p:extLst>
           </p:nvPr>
@@ -6880,7 +6877,11 @@
                     <a:p>
                       <a:r>
                         <a:rPr lang="en-GB" dirty="0" smtClean="0"/>
-                        <a:t>/posts/new/tag1+tag2+...</a:t>
+                        <a:t>/</a:t>
+                      </a:r>
+                      <a:r>
+                        <a:rPr lang="en-GB" dirty="0" smtClean="0"/>
+                        <a:t>posts/new/tag1+tag2+...</a:t>
                       </a:r>
                       <a:endParaRPr lang="en-GB" dirty="0"/>
                     </a:p>
@@ -6910,7 +6911,11 @@
                     <a:p>
                       <a:r>
                         <a:rPr lang="en-GB" dirty="0" smtClean="0"/>
-                        <a:t>/posts/bark</a:t>
+                        <a:t>/</a:t>
+                      </a:r>
+                      <a:r>
+                        <a:rPr lang="en-GB" dirty="0" smtClean="0"/>
+                        <a:t>posts/new</a:t>
                       </a:r>
                       <a:endParaRPr lang="en-GB" dirty="0"/>
                     </a:p>
@@ -6978,7 +6983,11 @@
                     <a:p>
                       <a:r>
                         <a:rPr lang="en-GB" dirty="0" smtClean="0"/>
-                        <a:t>/user/username</a:t>
+                        <a:t>/</a:t>
+                      </a:r>
+                      <a:r>
+                        <a:rPr lang="en-GB" dirty="0" smtClean="0"/>
+                        <a:t>users/username</a:t>
                       </a:r>
                       <a:endParaRPr lang="en-GB" dirty="0"/>
                     </a:p>
@@ -7205,7 +7214,7 @@
       </p:sp>
       <p:pic>
         <p:nvPicPr>
-          <p:cNvPr id="1026" name="Picture 2" descr="C:\Users\Ewan\Documents\GitHub\studeso\docs\diagrams\BarkER.png"/>
+          <p:cNvPr id="5" name="Picture 2" descr="H:\studeso\styling\images\akita.png"/>
           <p:cNvPicPr>
             <a:picLocks noChangeAspect="1" noChangeArrowheads="1"/>
           </p:cNvPicPr>
@@ -7213,40 +7222,6 @@
         </p:nvPicPr>
         <p:blipFill>
           <a:blip r:embed="rId2" cstate="print"/>
-          <a:stretch>
-            <a:fillRect/>
-          </a:stretch>
-        </p:blipFill>
-        <p:spPr bwMode="auto">
-          <a:xfrm>
-            <a:off x="897185" y="1240308"/>
-            <a:ext cx="7418983" cy="5429052"/>
-          </a:xfrm>
-          <a:prstGeom prst="rect">
-            <a:avLst/>
-          </a:prstGeom>
-          <a:noFill/>
-          <a:extLst>
-            <a:ext uri="{909E8E84-426E-40DD-AFC4-6F175D3DCCD1}">
-              <a14:hiddenFill xmlns:a14="http://schemas.microsoft.com/office/drawing/2010/main">
-                <a:solidFill>
-                  <a:srgbClr val="FFFFFF"/>
-                </a:solidFill>
-              </a14:hiddenFill>
-            </a:ext>
-          </a:extLst>
-        </p:spPr>
-      </p:pic>
-      <p:pic>
-        <p:nvPicPr>
-          <p:cNvPr id="5" name="Picture 2" descr="H:\studeso\styling\images\akita.png"/>
-          <p:cNvPicPr>
-            <a:picLocks noChangeAspect="1" noChangeArrowheads="1"/>
-          </p:cNvPicPr>
-          <p:nvPr/>
-        </p:nvPicPr>
-        <p:blipFill>
-          <a:blip r:embed="rId3" cstate="print"/>
           <a:srcRect/>
           <a:stretch>
             <a:fillRect/>
@@ -7261,6 +7236,36 @@
             <a:avLst/>
           </a:prstGeom>
           <a:noFill/>
+        </p:spPr>
+      </p:pic>
+      <p:pic>
+        <p:nvPicPr>
+          <p:cNvPr id="3" name="Picture 2"/>
+          <p:cNvPicPr>
+            <a:picLocks noChangeAspect="1"/>
+          </p:cNvPicPr>
+          <p:nvPr/>
+        </p:nvPicPr>
+        <p:blipFill>
+          <a:blip r:embed="rId3">
+            <a:extLst>
+              <a:ext uri="{28A0092B-C50C-407E-A947-70E740481C1C}">
+                <a14:useLocalDpi xmlns:a14="http://schemas.microsoft.com/office/drawing/2010/main" val="0"/>
+              </a:ext>
+            </a:extLst>
+          </a:blip>
+          <a:stretch>
+            <a:fillRect/>
+          </a:stretch>
+        </p:blipFill>
+        <p:spPr>
+          <a:xfrm>
+            <a:off x="881286" y="1187624"/>
+            <a:ext cx="7381428" cy="5401570"/>
+          </a:xfrm>
+          <a:prstGeom prst="rect">
+            <a:avLst/>
+          </a:prstGeom>
         </p:spPr>
       </p:pic>
     </p:spTree>

</xml_diff>